<commit_message>
Update the contents of documents
Upate the teaching PPT and lab guide.

Signed-off-by: manjucc <106427133@qq.com>
</commit_message>
<xml_diff>
--- a/lfs-7.7-systemd/documents/LFS-on-opnEuler_v1.3.pptx
+++ b/lfs-7.7-systemd/documents/LFS-on-opnEuler_v1.3.pptx
@@ -28099,7 +28099,12 @@
             <p:ph type="body" sz="quarter" idx="10"/>
           </p:nvPr>
         </p:nvSpPr>
-        <p:spPr/>
+        <p:spPr>
+          <a:xfrm>
+            <a:off x="1019175" y="1844675"/>
+            <a:ext cx="10153650" cy="4356100"/>
+          </a:xfrm>
+        </p:spPr>
         <p:txBody>
           <a:bodyPr/>
           <a:lstStyle/>
@@ -28177,6 +28182,26 @@
               <a:t>https://www.hikunpeng.com/zh/</a:t>
             </a:r>
             <a:endParaRPr lang="en-US" altLang="zh-CN" dirty="0"/>
+          </a:p>
+          <a:p>
+            <a:r>
+              <a:rPr lang="en-US" altLang="zh-CN" dirty="0" err="1"/>
+              <a:t>Gitee</a:t>
+            </a:r>
+            <a:r>
+              <a:rPr lang="zh-TW" altLang="en-US" dirty="0"/>
+              <a:t>工作流说明：</a:t>
+            </a:r>
+            <a:r>
+              <a:rPr lang="en-US" altLang="zh-CN" dirty="0">
+                <a:hlinkClick r:id="rId7"/>
+              </a:rPr>
+              <a:t>https://gitee.com/openeuler/community/blob/master/zh/contributors/Gitee-workflow.md</a:t>
+            </a:r>
+            <a:r>
+              <a:rPr lang="en-US" altLang="zh-CN" dirty="0"/>
+              <a:t> </a:t>
+            </a:r>
           </a:p>
           <a:p>
             <a:endParaRPr lang="en-US" altLang="zh-CN" dirty="0"/>
@@ -28367,6 +28392,26 @@
               <a:t>著，姜楠、袁志鹏译</a:t>
             </a:r>
             <a:endParaRPr lang="en-US" altLang="zh-CN" dirty="0"/>
+          </a:p>
+          <a:p>
+            <a:r>
+              <a:rPr lang="nn-NO" altLang="zh-CN" dirty="0"/>
+              <a:t>HCIA-openEuler </a:t>
+            </a:r>
+            <a:r>
+              <a:rPr lang="zh-CN" altLang="nn-NO" dirty="0"/>
+              <a:t>认证：</a:t>
+            </a:r>
+            <a:r>
+              <a:rPr lang="nn-NO" altLang="zh-CN" dirty="0">
+                <a:hlinkClick r:id="rId3"/>
+              </a:rPr>
+              <a:t>https://e.huawei.com/cn/talent/#/cert/product-details?certifiedProductId=383&amp;authenticationLevel=CTYPE_CARE_HCIA&amp;technicalField=PSC&amp;version=1.0</a:t>
+            </a:r>
+            <a:r>
+              <a:rPr lang="en-US" altLang="zh-CN" dirty="0"/>
+              <a:t> </a:t>
+            </a:r>
           </a:p>
           <a:p>
             <a:endParaRPr lang="zh-CN" altLang="en-US" dirty="0"/>
@@ -28447,7 +28492,7 @@
           <p:nvPr>
             <p:extLst>
               <p:ext uri="{D42A27DB-BD31-4B8C-83A1-F6EECF244321}">
-                <p14:modId xmlns:p14="http://schemas.microsoft.com/office/powerpoint/2010/main" val="2177518501"/>
+                <p14:modId xmlns:p14="http://schemas.microsoft.com/office/powerpoint/2010/main" val="3374805318"/>
               </p:ext>
             </p:extLst>
           </p:nvPr>
@@ -28715,7 +28760,7 @@
                       <a:pPr algn="l"/>
                       <a:r>
                         <a:rPr lang="zh-CN" altLang="en-US" sz="1600" dirty="0"/>
-                        <a:t>白手起家构建</a:t>
+                        <a:t>白手起家构建 </a:t>
                       </a:r>
                       <a:r>
                         <a:rPr lang="en-US" altLang="zh-CN" sz="1600" dirty="0"/>
@@ -28806,7 +28851,7 @@
                       </a:pPr>
                       <a:r>
                         <a:rPr lang="en-US" altLang="zh-CN" sz="1600" dirty="0"/>
-                        <a:t>Linux</a:t>
+                        <a:t>Linux </a:t>
                       </a:r>
                       <a:r>
                         <a:rPr lang="zh-CN" altLang="en-US" sz="1600" dirty="0"/>
@@ -28927,12 +28972,16 @@
                         <a:defRPr/>
                       </a:pPr>
                       <a:r>
-                        <a:rPr lang="en-US" altLang="zh-CN" sz="1600" dirty="0"/>
-                        <a:t>UNIX</a:t>
+                        <a:rPr lang="en-US" altLang="zh-CN" sz="1600"/>
+                        <a:t>UNIX </a:t>
+                      </a:r>
+                      <a:r>
+                        <a:rPr lang="zh-CN" altLang="en-US" sz="1600"/>
+                        <a:t>可</a:t>
                       </a:r>
                       <a:r>
                         <a:rPr lang="zh-CN" altLang="en-US" sz="1600" dirty="0"/>
-                        <a:t>可移植操作系统接口</a:t>
+                        <a:t>移植操作系统接口</a:t>
                       </a:r>
                     </a:p>
                   </a:txBody>

</xml_diff>

<commit_message>
Update the content of document
Update the teaching PPT.

Signed-off-by: manjucc <106427133@qq.com>
</commit_message>
<xml_diff>
--- a/lfs-7.7-systemd/documents/LFS-on-opnEuler_v1.3.pptx
+++ b/lfs-7.7-systemd/documents/LFS-on-opnEuler_v1.3.pptx
@@ -8,10 +8,10 @@
     <p:sldMasterId id="2147483891" r:id="rId7"/>
   </p:sldMasterIdLst>
   <p:notesMasterIdLst>
-    <p:notesMasterId r:id="rId40"/>
+    <p:notesMasterId r:id="rId41"/>
   </p:notesMasterIdLst>
   <p:handoutMasterIdLst>
-    <p:handoutMasterId r:id="rId41"/>
+    <p:handoutMasterId r:id="rId42"/>
   </p:handoutMasterIdLst>
   <p:sldIdLst>
     <p:sldId id="257" r:id="rId8"/>
@@ -35,17 +35,18 @@
     <p:sldId id="318" r:id="rId26"/>
     <p:sldId id="319" r:id="rId27"/>
     <p:sldId id="320" r:id="rId28"/>
-    <p:sldId id="275" r:id="rId29"/>
-    <p:sldId id="278" r:id="rId30"/>
-    <p:sldId id="279" r:id="rId31"/>
-    <p:sldId id="321" r:id="rId32"/>
-    <p:sldId id="297" r:id="rId33"/>
-    <p:sldId id="294" r:id="rId34"/>
-    <p:sldId id="265" r:id="rId35"/>
-    <p:sldId id="268" r:id="rId36"/>
-    <p:sldId id="269" r:id="rId37"/>
-    <p:sldId id="295" r:id="rId38"/>
-    <p:sldId id="296" r:id="rId39"/>
+    <p:sldId id="323" r:id="rId29"/>
+    <p:sldId id="275" r:id="rId30"/>
+    <p:sldId id="278" r:id="rId31"/>
+    <p:sldId id="279" r:id="rId32"/>
+    <p:sldId id="321" r:id="rId33"/>
+    <p:sldId id="297" r:id="rId34"/>
+    <p:sldId id="294" r:id="rId35"/>
+    <p:sldId id="265" r:id="rId36"/>
+    <p:sldId id="268" r:id="rId37"/>
+    <p:sldId id="269" r:id="rId38"/>
+    <p:sldId id="295" r:id="rId39"/>
+    <p:sldId id="296" r:id="rId40"/>
   </p:sldIdLst>
   <p:sldSz cx="12192000" cy="6858000"/>
   <p:notesSz cx="7010400" cy="9296400"/>
@@ -27134,7 +27135,42 @@
       </p:grpSpPr>
       <p:sp>
         <p:nvSpPr>
-          <p:cNvPr id="2" name="文本占位符 1"/>
+          <p:cNvPr id="2" name="Title 1">
+            <a:extLst>
+              <a:ext uri="{FF2B5EF4-FFF2-40B4-BE49-F238E27FC236}">
+                <a16:creationId xmlns:a16="http://schemas.microsoft.com/office/drawing/2014/main" id="{F9E1EE7A-8352-4A12-BAEC-707F988F2348}"/>
+              </a:ext>
+            </a:extLst>
+          </p:cNvPr>
+          <p:cNvSpPr>
+            <a:spLocks noGrp="1"/>
+          </p:cNvSpPr>
+          <p:nvPr>
+            <p:ph type="title"/>
+          </p:nvPr>
+        </p:nvSpPr>
+        <p:spPr/>
+        <p:txBody>
+          <a:bodyPr/>
+          <a:lstStyle/>
+          <a:p>
+            <a:r>
+              <a:rPr lang="zh-CN" altLang="en-US" dirty="0"/>
+              <a:t>构建者的几次角色转换</a:t>
+            </a:r>
+            <a:endParaRPr lang="en-US" dirty="0"/>
+          </a:p>
+        </p:txBody>
+      </p:sp>
+      <p:sp>
+        <p:nvSpPr>
+          <p:cNvPr id="3" name="Text Placeholder 2">
+            <a:extLst>
+              <a:ext uri="{FF2B5EF4-FFF2-40B4-BE49-F238E27FC236}">
+                <a16:creationId xmlns:a16="http://schemas.microsoft.com/office/drawing/2014/main" id="{74262E03-DE47-4A93-80DC-F75939A749C9}"/>
+              </a:ext>
+            </a:extLst>
+          </p:cNvPr>
           <p:cNvSpPr>
             <a:spLocks noGrp="1"/>
           </p:cNvSpPr>
@@ -27142,89 +27178,164 @@
             <p:ph type="body" sz="quarter" idx="10"/>
           </p:nvPr>
         </p:nvSpPr>
-        <p:spPr/>
+        <p:spPr>
+          <a:xfrm>
+            <a:off x="455612" y="933450"/>
+            <a:ext cx="11293475" cy="5267325"/>
+          </a:xfrm>
+        </p:spPr>
         <p:txBody>
           <a:bodyPr/>
           <a:lstStyle/>
           <a:p>
             <a:r>
-              <a:rPr lang="zh-CN" altLang="en-US" dirty="0">
-                <a:solidFill>
-                  <a:schemeClr val="bg1">
-                    <a:lumMod val="50000"/>
-                  </a:schemeClr>
-                </a:solidFill>
-              </a:rPr>
-              <a:t>前置知识和技能</a:t>
-            </a:r>
-            <a:endParaRPr lang="en-US" altLang="zh-CN" dirty="0">
-              <a:solidFill>
-                <a:schemeClr val="bg1">
-                  <a:lumMod val="50000"/>
-                </a:schemeClr>
-              </a:solidFill>
-            </a:endParaRPr>
-          </a:p>
-          <a:p>
-            <a:r>
-              <a:rPr lang="zh-CN" altLang="en-US" dirty="0">
-                <a:solidFill>
-                  <a:schemeClr val="bg1">
-                    <a:lumMod val="50000"/>
-                  </a:schemeClr>
-                </a:solidFill>
-              </a:rPr>
-              <a:t>交叉编译</a:t>
-            </a:r>
-            <a:endParaRPr lang="en-US" altLang="zh-CN" dirty="0">
-              <a:solidFill>
-                <a:schemeClr val="bg1">
-                  <a:lumMod val="50000"/>
-                </a:schemeClr>
-              </a:solidFill>
-            </a:endParaRPr>
-          </a:p>
-          <a:p>
-            <a:r>
-              <a:rPr lang="en-US" altLang="zh-CN" dirty="0">
-                <a:solidFill>
-                  <a:schemeClr val="bg1">
-                    <a:lumMod val="50000"/>
-                  </a:schemeClr>
-                </a:solidFill>
-              </a:rPr>
+              <a:rPr lang="zh-CN" altLang="en-US" dirty="0"/>
+              <a:t>最开始，宿主系统的 </a:t>
+            </a:r>
+            <a:r>
+              <a:rPr lang="en-US" altLang="zh-CN" dirty="0"/>
+              <a:t>root </a:t>
+            </a:r>
+            <a:r>
+              <a:rPr lang="zh-CN" altLang="en-US" dirty="0"/>
+              <a:t>用户准备好宿主系统的软件环境，为宿主系统的 </a:t>
+            </a:r>
+            <a:r>
+              <a:rPr lang="en-US" altLang="zh-CN" dirty="0" err="1"/>
+              <a:t>lfs</a:t>
+            </a:r>
+            <a:r>
+              <a:rPr lang="en-US" altLang="zh-CN" dirty="0"/>
+              <a:t> </a:t>
+            </a:r>
+            <a:r>
+              <a:rPr lang="zh-CN" altLang="en-US" dirty="0"/>
+              <a:t>用户铺平了道路；</a:t>
+            </a:r>
+            <a:endParaRPr lang="en-US" altLang="zh-CN" dirty="0"/>
+          </a:p>
+          <a:p>
+            <a:r>
+              <a:rPr lang="zh-CN" altLang="en-US" dirty="0"/>
+              <a:t>然后，宿主系统的 </a:t>
+            </a:r>
+            <a:r>
+              <a:rPr lang="en-US" altLang="zh-CN" dirty="0" err="1"/>
+              <a:t>lfs</a:t>
+            </a:r>
+            <a:r>
+              <a:rPr lang="en-US" altLang="zh-CN" dirty="0"/>
+              <a:t> </a:t>
+            </a:r>
+            <a:r>
+              <a:rPr lang="zh-CN" altLang="en-US" dirty="0"/>
+              <a:t>用户构建好临时工具链，为宿主系统的 </a:t>
+            </a:r>
+            <a:r>
+              <a:rPr lang="en-US" altLang="zh-CN" dirty="0"/>
+              <a:t>chrooted-root </a:t>
+            </a:r>
+            <a:r>
+              <a:rPr lang="zh-CN" altLang="en-US" dirty="0"/>
+              <a:t>用户铺平了道路；</a:t>
+            </a:r>
+            <a:endParaRPr lang="en-US" altLang="zh-CN" dirty="0"/>
+          </a:p>
+          <a:p>
+            <a:r>
+              <a:rPr lang="zh-CN" altLang="en-US" dirty="0"/>
+              <a:t>接着，</a:t>
+            </a:r>
+            <a:r>
+              <a:rPr lang="en-US" altLang="zh-CN" dirty="0"/>
+              <a:t>chrooted-root </a:t>
+            </a:r>
+            <a:r>
+              <a:rPr lang="zh-CN" altLang="en-US" dirty="0"/>
+              <a:t>用户构建好基本系统软件、进行系统配置、编译并安装内核，为 </a:t>
+            </a:r>
+            <a:r>
+              <a:rPr lang="en-US" altLang="zh-CN" dirty="0"/>
               <a:t>LFS </a:t>
             </a:r>
             <a:r>
-              <a:rPr lang="zh-CN" altLang="en-US" dirty="0">
-                <a:solidFill>
-                  <a:schemeClr val="bg1">
-                    <a:lumMod val="50000"/>
-                  </a:schemeClr>
-                </a:solidFill>
-              </a:rPr>
-              <a:t>构建过程</a:t>
-            </a:r>
-            <a:endParaRPr lang="en-US" altLang="zh-CN" dirty="0">
-              <a:solidFill>
-                <a:schemeClr val="bg1">
-                  <a:lumMod val="50000"/>
-                </a:schemeClr>
-              </a:solidFill>
-            </a:endParaRPr>
-          </a:p>
-          <a:p>
-            <a:r>
-              <a:rPr lang="zh-CN" altLang="en-US" dirty="0"/>
-              <a:t>其他说明</a:t>
-            </a:r>
+              <a:rPr lang="zh-CN" altLang="en-US" dirty="0"/>
+              <a:t>目标系统的 </a:t>
+            </a:r>
+            <a:r>
+              <a:rPr lang="en-US" altLang="zh-CN" dirty="0"/>
+              <a:t>root </a:t>
+            </a:r>
+            <a:r>
+              <a:rPr lang="zh-CN" altLang="en-US" dirty="0"/>
+              <a:t>用户铺平了道路；</a:t>
+            </a:r>
+            <a:endParaRPr lang="en-US" altLang="zh-CN" dirty="0"/>
+          </a:p>
+          <a:p>
+            <a:r>
+              <a:rPr lang="zh-CN" altLang="en-US" dirty="0"/>
+              <a:t>最后，宿主系统的 </a:t>
+            </a:r>
+            <a:r>
+              <a:rPr lang="en-US" altLang="zh-CN" dirty="0"/>
+              <a:t>root </a:t>
+            </a:r>
+            <a:r>
+              <a:rPr lang="zh-CN" altLang="en-US" dirty="0"/>
+              <a:t>用户通过配置宿主系统的 </a:t>
+            </a:r>
+            <a:r>
+              <a:rPr lang="en-US" altLang="zh-CN" dirty="0"/>
+              <a:t>GRUB </a:t>
+            </a:r>
+            <a:r>
+              <a:rPr lang="zh-CN" altLang="en-US" dirty="0"/>
+              <a:t>菜单为 </a:t>
+            </a:r>
+            <a:r>
+              <a:rPr lang="en-US" altLang="zh-CN" dirty="0"/>
+              <a:t>LFS </a:t>
+            </a:r>
+            <a:r>
+              <a:rPr lang="zh-CN" altLang="en-US" dirty="0"/>
+              <a:t>目标系统在宿主系统启动阶段提供了一个入口；</a:t>
+            </a:r>
+            <a:endParaRPr lang="en-US" altLang="zh-CN" dirty="0"/>
+          </a:p>
+          <a:p>
+            <a:r>
+              <a:rPr lang="zh-CN" altLang="en-US" dirty="0"/>
+              <a:t>这样，最终 </a:t>
+            </a:r>
+            <a:r>
+              <a:rPr lang="en-US" altLang="zh-CN" dirty="0"/>
+              <a:t>LFS </a:t>
+            </a:r>
+            <a:r>
+              <a:rPr lang="zh-CN" altLang="en-US" dirty="0"/>
+              <a:t>目标系统的 </a:t>
+            </a:r>
+            <a:r>
+              <a:rPr lang="en-US" altLang="zh-CN" dirty="0"/>
+              <a:t>root </a:t>
+            </a:r>
+            <a:r>
+              <a:rPr lang="zh-CN" altLang="en-US" dirty="0"/>
+              <a:t>用户得以进入自己</a:t>
+            </a:r>
+            <a:r>
+              <a:rPr lang="zh-CN" altLang="en-US"/>
+              <a:t>的系统！</a:t>
+            </a:r>
+            <a:endParaRPr lang="en-US" dirty="0"/>
           </a:p>
         </p:txBody>
       </p:sp>
     </p:spTree>
     <p:extLst>
       <p:ext uri="{BB962C8B-B14F-4D97-AF65-F5344CB8AC3E}">
-        <p14:creationId xmlns:p14="http://schemas.microsoft.com/office/powerpoint/2010/main" val="3404363586"/>
+        <p14:creationId xmlns:p14="http://schemas.microsoft.com/office/powerpoint/2010/main" val="2434869386"/>
       </p:ext>
     </p:extLst>
   </p:cSld>
@@ -27253,34 +27364,7 @@
       </p:grpSpPr>
       <p:sp>
         <p:nvSpPr>
-          <p:cNvPr id="2" name="标题 1"/>
-          <p:cNvSpPr>
-            <a:spLocks noGrp="1"/>
-          </p:cNvSpPr>
-          <p:nvPr>
-            <p:ph type="title"/>
-          </p:nvPr>
-        </p:nvSpPr>
-        <p:spPr/>
-        <p:txBody>
-          <a:bodyPr/>
-          <a:lstStyle/>
-          <a:p>
-            <a:r>
-              <a:rPr lang="zh-CN" altLang="en-US" dirty="0"/>
-              <a:t>为什么选中 </a:t>
-            </a:r>
-            <a:r>
-              <a:rPr lang="en-US" altLang="zh-CN" dirty="0"/>
-              <a:t>LFS7.7-systemd</a:t>
-            </a:r>
-            <a:endParaRPr lang="zh-CN" altLang="en-US" dirty="0"/>
-          </a:p>
-        </p:txBody>
-      </p:sp>
-      <p:sp>
-        <p:nvSpPr>
-          <p:cNvPr id="3" name="文本占位符 2"/>
+          <p:cNvPr id="2" name="文本占位符 1"/>
           <p:cNvSpPr>
             <a:spLocks noGrp="1"/>
           </p:cNvSpPr>
@@ -27294,130 +27378,83 @@
           <a:lstStyle/>
           <a:p>
             <a:r>
-              <a:rPr lang="zh-CN" altLang="en-US" dirty="0"/>
-              <a:t>相对于高版本的 </a:t>
-            </a:r>
-            <a:r>
-              <a:rPr lang="en-US" altLang="zh-CN" dirty="0"/>
-              <a:t>GCC</a:t>
-            </a:r>
-            <a:r>
-              <a:rPr lang="zh-CN" altLang="en-US" dirty="0"/>
-              <a:t>，本实验所用 </a:t>
-            </a:r>
-            <a:r>
-              <a:rPr lang="en-US" altLang="zh-CN" dirty="0"/>
-              <a:t>GCC-4.9.2 </a:t>
-            </a:r>
-            <a:r>
-              <a:rPr lang="zh-CN" altLang="en-US" dirty="0"/>
-              <a:t>更容易供感兴趣的人从源码研究和学习。</a:t>
-            </a:r>
-          </a:p>
-          <a:p>
-            <a:r>
-              <a:rPr lang="zh-CN" altLang="en-US" dirty="0"/>
-              <a:t>相对于 </a:t>
-            </a:r>
-            <a:r>
-              <a:rPr lang="en-US" altLang="zh-CN" dirty="0"/>
-              <a:t>System V </a:t>
-            </a:r>
-            <a:r>
-              <a:rPr lang="en-US" altLang="zh-CN" dirty="0" err="1"/>
-              <a:t>init</a:t>
-            </a:r>
-            <a:r>
-              <a:rPr lang="zh-CN" altLang="en-US" dirty="0"/>
-              <a:t>，</a:t>
-            </a:r>
-            <a:r>
-              <a:rPr lang="en-US" altLang="zh-CN" dirty="0" err="1"/>
-              <a:t>systemd</a:t>
-            </a:r>
-            <a:r>
-              <a:rPr lang="en-US" altLang="zh-CN" dirty="0"/>
-              <a:t> </a:t>
-            </a:r>
-            <a:r>
-              <a:rPr lang="zh-CN" altLang="en-US" dirty="0"/>
-              <a:t>是 </a:t>
-            </a:r>
-            <a:r>
-              <a:rPr lang="en-US" altLang="zh-CN" dirty="0"/>
-              <a:t>Linux </a:t>
-            </a:r>
-            <a:r>
-              <a:rPr lang="zh-CN" altLang="en-US" dirty="0"/>
-              <a:t>上新出现的 </a:t>
-            </a:r>
-            <a:r>
-              <a:rPr lang="en-US" altLang="zh-CN" dirty="0" err="1"/>
-              <a:t>init</a:t>
-            </a:r>
-            <a:r>
-              <a:rPr lang="en-US" altLang="zh-CN" dirty="0"/>
-              <a:t> </a:t>
-            </a:r>
-            <a:r>
-              <a:rPr lang="zh-CN" altLang="en-US" dirty="0"/>
-              <a:t>实现之一。除了负责常规的启动过程，</a:t>
-            </a:r>
-            <a:r>
-              <a:rPr lang="en-US" altLang="zh-CN" dirty="0"/>
-              <a:t>system </a:t>
-            </a:r>
-            <a:r>
-              <a:rPr lang="zh-CN" altLang="en-US" dirty="0"/>
-              <a:t>还包含了一系列的 </a:t>
-            </a:r>
-            <a:r>
-              <a:rPr lang="en-US" altLang="zh-CN" dirty="0"/>
-              <a:t>Unix </a:t>
-            </a:r>
-            <a:r>
-              <a:rPr lang="zh-CN" altLang="en-US" dirty="0"/>
-              <a:t>标准服务，如 </a:t>
-            </a:r>
-            <a:r>
-              <a:rPr lang="en-US" altLang="zh-CN" dirty="0" err="1"/>
-              <a:t>cron</a:t>
-            </a:r>
-            <a:r>
-              <a:rPr lang="en-US" altLang="zh-CN" dirty="0"/>
-              <a:t> </a:t>
-            </a:r>
-            <a:r>
-              <a:rPr lang="zh-CN" altLang="en-US" dirty="0"/>
-              <a:t>和 </a:t>
-            </a:r>
-            <a:r>
-              <a:rPr lang="en-US" altLang="zh-CN" dirty="0" err="1"/>
-              <a:t>inetd</a:t>
-            </a:r>
-            <a:r>
-              <a:rPr lang="zh-CN" altLang="en-US" dirty="0"/>
-              <a:t>。可以借助本实验从源码研究和学习 </a:t>
-            </a:r>
-            <a:r>
-              <a:rPr lang="en-US" altLang="zh-CN" dirty="0" err="1"/>
-              <a:t>systemd</a:t>
-            </a:r>
-            <a:r>
-              <a:rPr lang="zh-CN" altLang="en-US" dirty="0"/>
-              <a:t>。</a:t>
-            </a:r>
-            <a:endParaRPr lang="en-US" altLang="zh-CN" dirty="0"/>
-          </a:p>
-          <a:p>
-            <a:endParaRPr lang="zh-CN" altLang="en-US" dirty="0"/>
+              <a:rPr lang="zh-CN" altLang="en-US" dirty="0">
+                <a:solidFill>
+                  <a:schemeClr val="bg1">
+                    <a:lumMod val="50000"/>
+                  </a:schemeClr>
+                </a:solidFill>
+              </a:rPr>
+              <a:t>前置知识和技能</a:t>
+            </a:r>
+            <a:endParaRPr lang="en-US" altLang="zh-CN" dirty="0">
+              <a:solidFill>
+                <a:schemeClr val="bg1">
+                  <a:lumMod val="50000"/>
+                </a:schemeClr>
+              </a:solidFill>
+            </a:endParaRPr>
+          </a:p>
+          <a:p>
+            <a:r>
+              <a:rPr lang="zh-CN" altLang="en-US" dirty="0">
+                <a:solidFill>
+                  <a:schemeClr val="bg1">
+                    <a:lumMod val="50000"/>
+                  </a:schemeClr>
+                </a:solidFill>
+              </a:rPr>
+              <a:t>交叉编译</a:t>
+            </a:r>
+            <a:endParaRPr lang="en-US" altLang="zh-CN" dirty="0">
+              <a:solidFill>
+                <a:schemeClr val="bg1">
+                  <a:lumMod val="50000"/>
+                </a:schemeClr>
+              </a:solidFill>
+            </a:endParaRPr>
+          </a:p>
+          <a:p>
+            <a:r>
+              <a:rPr lang="en-US" altLang="zh-CN" dirty="0">
+                <a:solidFill>
+                  <a:schemeClr val="bg1">
+                    <a:lumMod val="50000"/>
+                  </a:schemeClr>
+                </a:solidFill>
+              </a:rPr>
+              <a:t>LFS </a:t>
+            </a:r>
+            <a:r>
+              <a:rPr lang="zh-CN" altLang="en-US" dirty="0">
+                <a:solidFill>
+                  <a:schemeClr val="bg1">
+                    <a:lumMod val="50000"/>
+                  </a:schemeClr>
+                </a:solidFill>
+              </a:rPr>
+              <a:t>构建过程</a:t>
+            </a:r>
+            <a:endParaRPr lang="en-US" altLang="zh-CN" dirty="0">
+              <a:solidFill>
+                <a:schemeClr val="bg1">
+                  <a:lumMod val="50000"/>
+                </a:schemeClr>
+              </a:solidFill>
+            </a:endParaRPr>
+          </a:p>
+          <a:p>
+            <a:r>
+              <a:rPr lang="zh-CN" altLang="en-US" dirty="0"/>
+              <a:t>其他说明</a:t>
+            </a:r>
           </a:p>
         </p:txBody>
       </p:sp>
     </p:spTree>
     <p:extLst>
       <p:ext uri="{BB962C8B-B14F-4D97-AF65-F5344CB8AC3E}">
-        <p14:creationId xmlns:p14="http://schemas.microsoft.com/office/powerpoint/2010/main" val="417616095"/>
+        <p14:creationId xmlns:p14="http://schemas.microsoft.com/office/powerpoint/2010/main" val="3404363586"/>
       </p:ext>
     </p:extLst>
   </p:cSld>
@@ -27460,13 +27497,14 @@
           <a:lstStyle/>
           <a:p>
             <a:r>
+              <a:rPr lang="zh-CN" altLang="en-US" dirty="0"/>
+              <a:t>为什么选中 </a:t>
+            </a:r>
+            <a:r>
               <a:rPr lang="en-US" altLang="zh-CN" dirty="0"/>
-              <a:t>GCC-4.9.2 </a:t>
-            </a:r>
-            <a:r>
-              <a:rPr lang="zh-CN" altLang="en-US" dirty="0"/>
-              <a:t>编译问题</a:t>
-            </a:r>
+              <a:t>LFS7.7-systemd</a:t>
+            </a:r>
+            <a:endParaRPr lang="zh-CN" altLang="en-US" dirty="0"/>
           </a:p>
         </p:txBody>
       </p:sp>
@@ -27486,28 +27524,46 @@
           <a:lstStyle/>
           <a:p>
             <a:r>
+              <a:rPr lang="zh-CN" altLang="en-US" dirty="0"/>
+              <a:t>相对于高版本的 </a:t>
+            </a:r>
+            <a:r>
+              <a:rPr lang="en-US" altLang="zh-CN" dirty="0"/>
+              <a:t>GCC</a:t>
+            </a:r>
+            <a:r>
+              <a:rPr lang="zh-CN" altLang="en-US" dirty="0"/>
+              <a:t>，本实验所用 </a:t>
+            </a:r>
+            <a:r>
               <a:rPr lang="en-US" altLang="zh-CN" dirty="0"/>
               <a:t>GCC-4.9.2 </a:t>
             </a:r>
             <a:r>
               <a:rPr lang="zh-CN" altLang="en-US" dirty="0"/>
-              <a:t>源码包中的 </a:t>
+              <a:t>更容易供感兴趣的人从源码研究和学习。</a:t>
+            </a:r>
+          </a:p>
+          <a:p>
+            <a:r>
+              <a:rPr lang="zh-CN" altLang="en-US" dirty="0"/>
+              <a:t>相对于 </a:t>
             </a:r>
             <a:r>
               <a:rPr lang="en-US" altLang="zh-CN" dirty="0"/>
-              <a:t>gcc-4.9.2/</a:t>
+              <a:t>System V </a:t>
             </a:r>
             <a:r>
               <a:rPr lang="en-US" altLang="zh-CN" dirty="0" err="1"/>
-              <a:t>gcc</a:t>
-            </a:r>
-            <a:r>
-              <a:rPr lang="en-US" altLang="zh-CN" dirty="0"/>
-              <a:t>/cp/</a:t>
+              <a:t>init</a:t>
+            </a:r>
+            <a:r>
+              <a:rPr lang="zh-CN" altLang="en-US" dirty="0"/>
+              <a:t>，</a:t>
             </a:r>
             <a:r>
               <a:rPr lang="en-US" altLang="zh-CN" dirty="0" err="1"/>
-              <a:t>cfns.h</a:t>
+              <a:t>systemd</a:t>
             </a:r>
             <a:r>
               <a:rPr lang="en-US" altLang="zh-CN" dirty="0"/>
@@ -27515,36 +27571,71 @@
             </a:r>
             <a:r>
               <a:rPr lang="zh-CN" altLang="en-US" dirty="0"/>
-              <a:t>文件中出现编译错误。</a:t>
-            </a:r>
-          </a:p>
-          <a:p>
-            <a:r>
-              <a:rPr lang="zh-CN" altLang="en-US" dirty="0"/>
-              <a:t>从另一方面来说，这是一个锻炼机会，因为学过 </a:t>
+              <a:t>是 </a:t>
             </a:r>
             <a:r>
               <a:rPr lang="en-US" altLang="zh-CN" dirty="0"/>
-              <a:t>C </a:t>
-            </a:r>
-            <a:r>
-              <a:rPr lang="zh-CN" altLang="en-US" dirty="0"/>
-              <a:t>语言的同学有能力解决此问题。</a:t>
-            </a:r>
-            <a:endParaRPr lang="en-US" altLang="zh-CN" dirty="0"/>
-          </a:p>
-          <a:p>
-            <a:r>
-              <a:rPr lang="zh-CN" altLang="en-US" dirty="0"/>
-              <a:t>本实验指导书提供了一种解决方案，已经得到该实验的验证（即成功构建了本实验所需的 </a:t>
+              <a:t>Linux </a:t>
+            </a:r>
+            <a:r>
+              <a:rPr lang="zh-CN" altLang="en-US" dirty="0"/>
+              <a:t>上新出现的 </a:t>
+            </a:r>
+            <a:r>
+              <a:rPr lang="en-US" altLang="zh-CN" dirty="0" err="1"/>
+              <a:t>init</a:t>
             </a:r>
             <a:r>
               <a:rPr lang="en-US" altLang="zh-CN" dirty="0"/>
-              <a:t>LFS </a:t>
-            </a:r>
-            <a:r>
-              <a:rPr lang="zh-CN" altLang="en-US" dirty="0"/>
-              <a:t>目标系统）。</a:t>
+              <a:t> </a:t>
+            </a:r>
+            <a:r>
+              <a:rPr lang="zh-CN" altLang="en-US" dirty="0"/>
+              <a:t>实现之一。除了负责常规的启动过程，</a:t>
+            </a:r>
+            <a:r>
+              <a:rPr lang="en-US" altLang="zh-CN" dirty="0"/>
+              <a:t>system </a:t>
+            </a:r>
+            <a:r>
+              <a:rPr lang="zh-CN" altLang="en-US" dirty="0"/>
+              <a:t>还包含了一系列的 </a:t>
+            </a:r>
+            <a:r>
+              <a:rPr lang="en-US" altLang="zh-CN" dirty="0"/>
+              <a:t>Unix </a:t>
+            </a:r>
+            <a:r>
+              <a:rPr lang="zh-CN" altLang="en-US" dirty="0"/>
+              <a:t>标准服务，如 </a:t>
+            </a:r>
+            <a:r>
+              <a:rPr lang="en-US" altLang="zh-CN" dirty="0" err="1"/>
+              <a:t>cron</a:t>
+            </a:r>
+            <a:r>
+              <a:rPr lang="en-US" altLang="zh-CN" dirty="0"/>
+              <a:t> </a:t>
+            </a:r>
+            <a:r>
+              <a:rPr lang="zh-CN" altLang="en-US" dirty="0"/>
+              <a:t>和 </a:t>
+            </a:r>
+            <a:r>
+              <a:rPr lang="en-US" altLang="zh-CN" dirty="0" err="1"/>
+              <a:t>inetd</a:t>
+            </a:r>
+            <a:r>
+              <a:rPr lang="zh-CN" altLang="en-US" dirty="0"/>
+              <a:t>。可以借助本实验从源码研究和学习 </a:t>
+            </a:r>
+            <a:r>
+              <a:rPr lang="en-US" altLang="zh-CN" dirty="0" err="1"/>
+              <a:t>systemd</a:t>
+            </a:r>
+            <a:r>
+              <a:rPr lang="zh-CN" altLang="en-US" dirty="0"/>
+              <a:t>。</a:t>
             </a:r>
             <a:endParaRPr lang="en-US" altLang="zh-CN" dirty="0"/>
           </a:p>
@@ -27556,7 +27647,7 @@
     </p:spTree>
     <p:extLst>
       <p:ext uri="{BB962C8B-B14F-4D97-AF65-F5344CB8AC3E}">
-        <p14:creationId xmlns:p14="http://schemas.microsoft.com/office/powerpoint/2010/main" val="3889858877"/>
+        <p14:creationId xmlns:p14="http://schemas.microsoft.com/office/powerpoint/2010/main" val="417616095"/>
       </p:ext>
     </p:extLst>
   </p:cSld>
@@ -27600,7 +27691,7 @@
           <a:p>
             <a:r>
               <a:rPr lang="en-US" altLang="zh-CN" dirty="0"/>
-              <a:t>Man-DB-2.7.1 </a:t>
+              <a:t>GCC-4.9.2 </a:t>
             </a:r>
             <a:r>
               <a:rPr lang="zh-CN" altLang="en-US" dirty="0"/>
@@ -27625,6 +27716,145 @@
           <a:lstStyle/>
           <a:p>
             <a:r>
+              <a:rPr lang="en-US" altLang="zh-CN" dirty="0"/>
+              <a:t>GCC-4.9.2 </a:t>
+            </a:r>
+            <a:r>
+              <a:rPr lang="zh-CN" altLang="en-US" dirty="0"/>
+              <a:t>源码包中的 </a:t>
+            </a:r>
+            <a:r>
+              <a:rPr lang="en-US" altLang="zh-CN" dirty="0"/>
+              <a:t>gcc-4.9.2/</a:t>
+            </a:r>
+            <a:r>
+              <a:rPr lang="en-US" altLang="zh-CN" dirty="0" err="1"/>
+              <a:t>gcc</a:t>
+            </a:r>
+            <a:r>
+              <a:rPr lang="en-US" altLang="zh-CN" dirty="0"/>
+              <a:t>/cp/</a:t>
+            </a:r>
+            <a:r>
+              <a:rPr lang="en-US" altLang="zh-CN" dirty="0" err="1"/>
+              <a:t>cfns.h</a:t>
+            </a:r>
+            <a:r>
+              <a:rPr lang="en-US" altLang="zh-CN" dirty="0"/>
+              <a:t> </a:t>
+            </a:r>
+            <a:r>
+              <a:rPr lang="zh-CN" altLang="en-US" dirty="0"/>
+              <a:t>文件中出现编译错误。</a:t>
+            </a:r>
+          </a:p>
+          <a:p>
+            <a:r>
+              <a:rPr lang="zh-CN" altLang="en-US" dirty="0"/>
+              <a:t>从另一方面来说，这是一个锻炼机会，因为学过 </a:t>
+            </a:r>
+            <a:r>
+              <a:rPr lang="en-US" altLang="zh-CN" dirty="0"/>
+              <a:t>C </a:t>
+            </a:r>
+            <a:r>
+              <a:rPr lang="zh-CN" altLang="en-US" dirty="0"/>
+              <a:t>语言的同学有能力解决此问题。</a:t>
+            </a:r>
+            <a:endParaRPr lang="en-US" altLang="zh-CN" dirty="0"/>
+          </a:p>
+          <a:p>
+            <a:r>
+              <a:rPr lang="zh-CN" altLang="en-US" dirty="0"/>
+              <a:t>本实验指导书提供了一种解决方案，已经得到该实验的验证（即成功构建了本实验所需的 </a:t>
+            </a:r>
+            <a:r>
+              <a:rPr lang="en-US" altLang="zh-CN" dirty="0"/>
+              <a:t>LFS </a:t>
+            </a:r>
+            <a:r>
+              <a:rPr lang="zh-CN" altLang="en-US" dirty="0"/>
+              <a:t>目标系统）。</a:t>
+            </a:r>
+            <a:endParaRPr lang="en-US" altLang="zh-CN" dirty="0"/>
+          </a:p>
+          <a:p>
+            <a:endParaRPr lang="zh-CN" altLang="en-US" dirty="0"/>
+          </a:p>
+        </p:txBody>
+      </p:sp>
+    </p:spTree>
+    <p:extLst>
+      <p:ext uri="{BB962C8B-B14F-4D97-AF65-F5344CB8AC3E}">
+        <p14:creationId xmlns:p14="http://schemas.microsoft.com/office/powerpoint/2010/main" val="3889858877"/>
+      </p:ext>
+    </p:extLst>
+  </p:cSld>
+  <p:clrMapOvr>
+    <a:masterClrMapping/>
+  </p:clrMapOvr>
+</p:sld>
+</file>
+
+<file path=ppt/slides/slide26.xml><?xml version="1.0" encoding="utf-8"?>
+<p:sld xmlns:a="http://schemas.openxmlformats.org/drawingml/2006/main" xmlns:r="http://schemas.openxmlformats.org/officeDocument/2006/relationships" xmlns:p="http://schemas.openxmlformats.org/presentationml/2006/main">
+  <p:cSld>
+    <p:spTree>
+      <p:nvGrpSpPr>
+        <p:cNvPr id="1" name=""/>
+        <p:cNvGrpSpPr/>
+        <p:nvPr/>
+      </p:nvGrpSpPr>
+      <p:grpSpPr>
+        <a:xfrm>
+          <a:off x="0" y="0"/>
+          <a:ext cx="0" cy="0"/>
+          <a:chOff x="0" y="0"/>
+          <a:chExt cx="0" cy="0"/>
+        </a:xfrm>
+      </p:grpSpPr>
+      <p:sp>
+        <p:nvSpPr>
+          <p:cNvPr id="2" name="标题 1"/>
+          <p:cNvSpPr>
+            <a:spLocks noGrp="1"/>
+          </p:cNvSpPr>
+          <p:nvPr>
+            <p:ph type="title"/>
+          </p:nvPr>
+        </p:nvSpPr>
+        <p:spPr/>
+        <p:txBody>
+          <a:bodyPr/>
+          <a:lstStyle/>
+          <a:p>
+            <a:r>
+              <a:rPr lang="en-US" altLang="zh-CN" dirty="0"/>
+              <a:t>Man-DB-2.7.1 </a:t>
+            </a:r>
+            <a:r>
+              <a:rPr lang="zh-CN" altLang="en-US" dirty="0"/>
+              <a:t>编译问题</a:t>
+            </a:r>
+          </a:p>
+        </p:txBody>
+      </p:sp>
+      <p:sp>
+        <p:nvSpPr>
+          <p:cNvPr id="3" name="文本占位符 2"/>
+          <p:cNvSpPr>
+            <a:spLocks noGrp="1"/>
+          </p:cNvSpPr>
+          <p:nvPr>
+            <p:ph type="body" sz="quarter" idx="10"/>
+          </p:nvPr>
+        </p:nvSpPr>
+        <p:spPr/>
+        <p:txBody>
+          <a:bodyPr/>
+          <a:lstStyle/>
+          <a:p>
+            <a:r>
               <a:rPr lang="zh-CN" altLang="en-US" dirty="0"/>
               <a:t>在 </a:t>
             </a:r>
@@ -27693,7 +27923,7 @@
 </p:sld>
 </file>
 
-<file path=ppt/slides/slide26.xml><?xml version="1.0" encoding="utf-8"?>
+<file path=ppt/slides/slide27.xml><?xml version="1.0" encoding="utf-8"?>
 <p:sld xmlns:a="http://schemas.openxmlformats.org/drawingml/2006/main" xmlns:r="http://schemas.openxmlformats.org/officeDocument/2006/relationships" xmlns:p="http://schemas.openxmlformats.org/presentationml/2006/main">
   <p:cSld>
     <p:spTree>
@@ -27903,7 +28133,7 @@
 </p:sld>
 </file>
 
-<file path=ppt/slides/slide27.xml><?xml version="1.0" encoding="utf-8"?>
+<file path=ppt/slides/slide28.xml><?xml version="1.0" encoding="utf-8"?>
 <p:sld xmlns:a="http://schemas.openxmlformats.org/drawingml/2006/main" xmlns:r="http://schemas.openxmlformats.org/officeDocument/2006/relationships" xmlns:p="http://schemas.openxmlformats.org/presentationml/2006/main">
   <p:cSld>
     <p:spTree>
@@ -28006,7 +28236,7 @@
 </p:sld>
 </file>
 
-<file path=ppt/slides/slide28.xml><?xml version="1.0" encoding="utf-8"?>
+<file path=ppt/slides/slide29.xml><?xml version="1.0" encoding="utf-8"?>
 <p:sld xmlns:a="http://schemas.openxmlformats.org/drawingml/2006/main" xmlns:r="http://schemas.openxmlformats.org/officeDocument/2006/relationships" xmlns:p="http://schemas.openxmlformats.org/presentationml/2006/main">
   <p:cSld>
     <p:spTree>
@@ -28063,158 +28293,6 @@
     <p:extLst>
       <p:ext uri="{BB962C8B-B14F-4D97-AF65-F5344CB8AC3E}">
         <p14:creationId xmlns:p14="http://schemas.microsoft.com/office/powerpoint/2010/main" val="530091429"/>
-      </p:ext>
-    </p:extLst>
-  </p:cSld>
-  <p:clrMapOvr>
-    <a:masterClrMapping/>
-  </p:clrMapOvr>
-</p:sld>
-</file>
-
-<file path=ppt/slides/slide29.xml><?xml version="1.0" encoding="utf-8"?>
-<p:sld xmlns:a="http://schemas.openxmlformats.org/drawingml/2006/main" xmlns:r="http://schemas.openxmlformats.org/officeDocument/2006/relationships" xmlns:p="http://schemas.openxmlformats.org/presentationml/2006/main">
-  <p:cSld>
-    <p:spTree>
-      <p:nvGrpSpPr>
-        <p:cNvPr id="1" name=""/>
-        <p:cNvGrpSpPr/>
-        <p:nvPr/>
-      </p:nvGrpSpPr>
-      <p:grpSpPr>
-        <a:xfrm>
-          <a:off x="0" y="0"/>
-          <a:ext cx="0" cy="0"/>
-          <a:chOff x="0" y="0"/>
-          <a:chExt cx="0" cy="0"/>
-        </a:xfrm>
-      </p:grpSpPr>
-      <p:sp>
-        <p:nvSpPr>
-          <p:cNvPr id="3" name="文本占位符 2"/>
-          <p:cNvSpPr>
-            <a:spLocks noGrp="1"/>
-          </p:cNvSpPr>
-          <p:nvPr>
-            <p:ph type="body" sz="quarter" idx="10"/>
-          </p:nvPr>
-        </p:nvSpPr>
-        <p:spPr>
-          <a:xfrm>
-            <a:off x="1019175" y="1844675"/>
-            <a:ext cx="10153650" cy="4356100"/>
-          </a:xfrm>
-        </p:spPr>
-        <p:txBody>
-          <a:bodyPr/>
-          <a:lstStyle/>
-          <a:p>
-            <a:r>
-              <a:rPr lang="en-US" altLang="zh-CN" dirty="0" err="1"/>
-              <a:t>openEuler</a:t>
-            </a:r>
-            <a:r>
-              <a:rPr lang="en-US" altLang="zh-CN" dirty="0"/>
-              <a:t> </a:t>
-            </a:r>
-            <a:r>
-              <a:rPr lang="zh-CN" altLang="en-US" dirty="0"/>
-              <a:t>官网：</a:t>
-            </a:r>
-            <a:r>
-              <a:rPr lang="en-US" altLang="zh-CN" dirty="0">
-                <a:hlinkClick r:id="rId3"/>
-              </a:rPr>
-              <a:t>https://openeuler.org/</a:t>
-            </a:r>
-            <a:endParaRPr lang="en-US" altLang="zh-CN" dirty="0"/>
-          </a:p>
-          <a:p>
-            <a:r>
-              <a:rPr lang="zh-TW" altLang="en-US" dirty="0"/>
-              <a:t>项目托管地：</a:t>
-            </a:r>
-            <a:r>
-              <a:rPr lang="en-US" altLang="zh-CN" dirty="0">
-                <a:hlinkClick r:id="rId4"/>
-              </a:rPr>
-              <a:t>https://gitee.com/openeuler-practice-courses/lfs-course</a:t>
-            </a:r>
-            <a:r>
-              <a:rPr lang="en-US" altLang="zh-CN" dirty="0"/>
-              <a:t> </a:t>
-            </a:r>
-          </a:p>
-          <a:p>
-            <a:r>
-              <a:rPr lang="en-US" altLang="zh-CN" dirty="0"/>
-              <a:t>LFS </a:t>
-            </a:r>
-            <a:r>
-              <a:rPr lang="zh-CN" altLang="en-US" dirty="0"/>
-              <a:t>官网：</a:t>
-            </a:r>
-            <a:r>
-              <a:rPr lang="en-US" altLang="zh-CN" dirty="0"/>
-              <a:t> </a:t>
-            </a:r>
-            <a:r>
-              <a:rPr lang="en-US" altLang="zh-CN" dirty="0">
-                <a:hlinkClick r:id="rId5"/>
-              </a:rPr>
-              <a:t>https://www.linuxfromscratch.org/lfs/</a:t>
-            </a:r>
-            <a:endParaRPr lang="en-US" altLang="zh-CN" dirty="0"/>
-          </a:p>
-          <a:p>
-            <a:r>
-              <a:rPr lang="zh-CN" altLang="en-US" dirty="0"/>
-              <a:t>鲲鹏生态官网：</a:t>
-            </a:r>
-            <a:r>
-              <a:rPr lang="en-US" altLang="zh-CN" dirty="0"/>
-              <a:t> </a:t>
-            </a:r>
-            <a:r>
-              <a:rPr lang="en-US" altLang="zh-CN" dirty="0">
-                <a:hlinkClick r:id="rId6"/>
-              </a:rPr>
-              <a:t>https://www.hikunpeng.com/zh/</a:t>
-            </a:r>
-            <a:endParaRPr lang="en-US" altLang="zh-CN" dirty="0"/>
-          </a:p>
-          <a:p>
-            <a:r>
-              <a:rPr lang="en-US" altLang="zh-CN" dirty="0" err="1"/>
-              <a:t>Gitee</a:t>
-            </a:r>
-            <a:r>
-              <a:rPr lang="zh-TW" altLang="en-US" dirty="0"/>
-              <a:t>工作流说明：</a:t>
-            </a:r>
-            <a:r>
-              <a:rPr lang="en-US" altLang="zh-CN" dirty="0">
-                <a:hlinkClick r:id="rId7"/>
-              </a:rPr>
-              <a:t>https://gitee.com/openeuler/community/blob/master/zh/contributors/Gitee-workflow.md</a:t>
-            </a:r>
-            <a:r>
-              <a:rPr lang="en-US" altLang="zh-CN" dirty="0"/>
-              <a:t> </a:t>
-            </a:r>
-          </a:p>
-          <a:p>
-            <a:endParaRPr lang="en-US" altLang="zh-CN" dirty="0"/>
-          </a:p>
-          <a:p>
-            <a:endParaRPr lang="zh-CN" altLang="en-US" dirty="0"/>
-          </a:p>
-        </p:txBody>
-      </p:sp>
-    </p:spTree>
-    <p:extLst>
-      <p:ext uri="{BB962C8B-B14F-4D97-AF65-F5344CB8AC3E}">
-        <p14:creationId xmlns:p14="http://schemas.microsoft.com/office/powerpoint/2010/main" val="1724291223"/>
       </p:ext>
     </p:extLst>
   </p:cSld>
@@ -28319,6 +28397,158 @@
             <p:ph type="body" sz="quarter" idx="10"/>
           </p:nvPr>
         </p:nvSpPr>
+        <p:spPr>
+          <a:xfrm>
+            <a:off x="1019175" y="1844675"/>
+            <a:ext cx="10153650" cy="4356100"/>
+          </a:xfrm>
+        </p:spPr>
+        <p:txBody>
+          <a:bodyPr/>
+          <a:lstStyle/>
+          <a:p>
+            <a:r>
+              <a:rPr lang="en-US" altLang="zh-CN" dirty="0" err="1"/>
+              <a:t>openEuler</a:t>
+            </a:r>
+            <a:r>
+              <a:rPr lang="en-US" altLang="zh-CN" dirty="0"/>
+              <a:t> </a:t>
+            </a:r>
+            <a:r>
+              <a:rPr lang="zh-CN" altLang="en-US" dirty="0"/>
+              <a:t>官网：</a:t>
+            </a:r>
+            <a:r>
+              <a:rPr lang="en-US" altLang="zh-CN" dirty="0">
+                <a:hlinkClick r:id="rId3"/>
+              </a:rPr>
+              <a:t>https://openeuler.org/</a:t>
+            </a:r>
+            <a:endParaRPr lang="en-US" altLang="zh-CN" dirty="0"/>
+          </a:p>
+          <a:p>
+            <a:r>
+              <a:rPr lang="zh-TW" altLang="en-US" dirty="0"/>
+              <a:t>项目托管地：</a:t>
+            </a:r>
+            <a:r>
+              <a:rPr lang="en-US" altLang="zh-CN" dirty="0">
+                <a:hlinkClick r:id="rId4"/>
+              </a:rPr>
+              <a:t>https://gitee.com/openeuler-practice-courses/lfs-course</a:t>
+            </a:r>
+            <a:r>
+              <a:rPr lang="en-US" altLang="zh-CN" dirty="0"/>
+              <a:t> </a:t>
+            </a:r>
+          </a:p>
+          <a:p>
+            <a:r>
+              <a:rPr lang="en-US" altLang="zh-CN" dirty="0"/>
+              <a:t>LFS </a:t>
+            </a:r>
+            <a:r>
+              <a:rPr lang="zh-CN" altLang="en-US" dirty="0"/>
+              <a:t>官网：</a:t>
+            </a:r>
+            <a:r>
+              <a:rPr lang="en-US" altLang="zh-CN" dirty="0"/>
+              <a:t> </a:t>
+            </a:r>
+            <a:r>
+              <a:rPr lang="en-US" altLang="zh-CN" dirty="0">
+                <a:hlinkClick r:id="rId5"/>
+              </a:rPr>
+              <a:t>https://www.linuxfromscratch.org/lfs/</a:t>
+            </a:r>
+            <a:endParaRPr lang="en-US" altLang="zh-CN" dirty="0"/>
+          </a:p>
+          <a:p>
+            <a:r>
+              <a:rPr lang="zh-CN" altLang="en-US" dirty="0"/>
+              <a:t>鲲鹏生态官网：</a:t>
+            </a:r>
+            <a:r>
+              <a:rPr lang="en-US" altLang="zh-CN" dirty="0"/>
+              <a:t> </a:t>
+            </a:r>
+            <a:r>
+              <a:rPr lang="en-US" altLang="zh-CN" dirty="0">
+                <a:hlinkClick r:id="rId6"/>
+              </a:rPr>
+              <a:t>https://www.hikunpeng.com/zh/</a:t>
+            </a:r>
+            <a:endParaRPr lang="en-US" altLang="zh-CN" dirty="0"/>
+          </a:p>
+          <a:p>
+            <a:r>
+              <a:rPr lang="en-US" altLang="zh-CN" dirty="0" err="1"/>
+              <a:t>Gitee</a:t>
+            </a:r>
+            <a:r>
+              <a:rPr lang="zh-TW" altLang="en-US" dirty="0"/>
+              <a:t>工作流说明：</a:t>
+            </a:r>
+            <a:r>
+              <a:rPr lang="en-US" altLang="zh-CN" dirty="0">
+                <a:hlinkClick r:id="rId7"/>
+              </a:rPr>
+              <a:t>https://gitee.com/openeuler/community/blob/master/zh/contributors/Gitee-workflow.md</a:t>
+            </a:r>
+            <a:r>
+              <a:rPr lang="en-US" altLang="zh-CN" dirty="0"/>
+              <a:t> </a:t>
+            </a:r>
+          </a:p>
+          <a:p>
+            <a:endParaRPr lang="en-US" altLang="zh-CN" dirty="0"/>
+          </a:p>
+          <a:p>
+            <a:endParaRPr lang="zh-CN" altLang="en-US" dirty="0"/>
+          </a:p>
+        </p:txBody>
+      </p:sp>
+    </p:spTree>
+    <p:extLst>
+      <p:ext uri="{BB962C8B-B14F-4D97-AF65-F5344CB8AC3E}">
+        <p14:creationId xmlns:p14="http://schemas.microsoft.com/office/powerpoint/2010/main" val="1724291223"/>
+      </p:ext>
+    </p:extLst>
+  </p:cSld>
+  <p:clrMapOvr>
+    <a:masterClrMapping/>
+  </p:clrMapOvr>
+</p:sld>
+</file>
+
+<file path=ppt/slides/slide31.xml><?xml version="1.0" encoding="utf-8"?>
+<p:sld xmlns:a="http://schemas.openxmlformats.org/drawingml/2006/main" xmlns:r="http://schemas.openxmlformats.org/officeDocument/2006/relationships" xmlns:p="http://schemas.openxmlformats.org/presentationml/2006/main">
+  <p:cSld>
+    <p:spTree>
+      <p:nvGrpSpPr>
+        <p:cNvPr id="1" name=""/>
+        <p:cNvGrpSpPr/>
+        <p:nvPr/>
+      </p:nvGrpSpPr>
+      <p:grpSpPr>
+        <a:xfrm>
+          <a:off x="0" y="0"/>
+          <a:ext cx="0" cy="0"/>
+          <a:chOff x="0" y="0"/>
+          <a:chExt cx="0" cy="0"/>
+        </a:xfrm>
+      </p:grpSpPr>
+      <p:sp>
+        <p:nvSpPr>
+          <p:cNvPr id="3" name="文本占位符 2"/>
+          <p:cNvSpPr>
+            <a:spLocks noGrp="1"/>
+          </p:cNvSpPr>
+          <p:nvPr>
+            <p:ph type="body" sz="quarter" idx="10"/>
+          </p:nvPr>
+        </p:nvSpPr>
         <p:spPr/>
         <p:txBody>
           <a:bodyPr/>
@@ -28431,7 +28661,7 @@
 </p:sld>
 </file>
 
-<file path=ppt/slides/slide31.xml><?xml version="1.0" encoding="utf-8"?>
+<file path=ppt/slides/slide32.xml><?xml version="1.0" encoding="utf-8"?>
 <p:sld xmlns:a="http://schemas.openxmlformats.org/drawingml/2006/main" xmlns:r="http://schemas.openxmlformats.org/officeDocument/2006/relationships" xmlns:p="http://schemas.openxmlformats.org/presentationml/2006/main">
   <p:cSld>
     <p:spTree>
@@ -29118,7 +29348,7 @@
 </p:sld>
 </file>
 
-<file path=ppt/slides/slide32.xml><?xml version="1.0" encoding="utf-8"?>
+<file path=ppt/slides/slide33.xml><?xml version="1.0" encoding="utf-8"?>
 <p:sld xmlns:a="http://schemas.openxmlformats.org/drawingml/2006/main" xmlns:r="http://schemas.openxmlformats.org/officeDocument/2006/relationships" xmlns:p="http://schemas.openxmlformats.org/presentationml/2006/main">
   <p:cSld>
     <p:spTree>
@@ -32563,12 +32793,6 @@
 </file>
 
 <file path=customXml/item2.xml><?xml version="1.0" encoding="utf-8"?>
-<p:properties xmlns:p="http://schemas.microsoft.com/office/2006/metadata/properties" xmlns:xsi="http://www.w3.org/2001/XMLSchema-instance" xmlns:pc="http://schemas.microsoft.com/office/infopath/2007/PartnerControls">
-  <documentManagement/>
-</p:properties>
-</file>
-
-<file path=customXml/item3.xml><?xml version="1.0" encoding="utf-8"?>
 <ct:contentTypeSchema xmlns:ct="http://schemas.microsoft.com/office/2006/metadata/contentType" xmlns:ma="http://schemas.microsoft.com/office/2006/metadata/properties/metaAttributes" ct:_="" ma:_="" ma:contentTypeName="Document" ma:contentTypeID="0x010100CC226774B8D87F4D92D9D1F6859ED44E" ma:contentTypeVersion="1" ma:contentTypeDescription="Create a new document." ma:contentTypeScope="" ma:versionID="192c310b45bae95d9fdbb51d5532622b">
   <xsd:schema xmlns:xsd="http://www.w3.org/2001/XMLSchema" xmlns:xs="http://www.w3.org/2001/XMLSchema" xmlns:p="http://schemas.microsoft.com/office/2006/metadata/properties" xmlns:ns2="475f1e55-3009-46d8-9566-5d569a2b3a98" targetNamespace="http://schemas.microsoft.com/office/2006/metadata/properties" ma:root="true" ma:fieldsID="1d095aabec1d15598815726bd4b054a7" ns2:_="">
     <xsd:import namespace="475f1e55-3009-46d8-9566-5d569a2b3a98"/>
@@ -32708,6 +32932,12 @@
 </ct:contentTypeSchema>
 </file>
 
+<file path=customXml/item3.xml><?xml version="1.0" encoding="utf-8"?>
+<p:properties xmlns:p="http://schemas.microsoft.com/office/2006/metadata/properties" xmlns:xsi="http://www.w3.org/2001/XMLSchema-instance" xmlns:pc="http://schemas.microsoft.com/office/infopath/2007/PartnerControls">
+  <documentManagement/>
+</p:properties>
+</file>
+
 <file path=customXml/itemProps1.xml><?xml version="1.0" encoding="utf-8"?>
 <ds:datastoreItem xmlns:ds="http://schemas.openxmlformats.org/officeDocument/2006/customXml" ds:itemID="{FEDE263F-0510-4442-823E-69B63ECB61E1}">
   <ds:schemaRefs>
@@ -32717,22 +32947,6 @@
 </file>
 
 <file path=customXml/itemProps2.xml><?xml version="1.0" encoding="utf-8"?>
-<ds:datastoreItem xmlns:ds="http://schemas.openxmlformats.org/officeDocument/2006/customXml" ds:itemID="{DA5960F2-6186-408B-A0DC-5CA5E58B604F}">
-  <ds:schemaRefs>
-    <ds:schemaRef ds:uri="http://www.w3.org/XML/1998/namespace"/>
-    <ds:schemaRef ds:uri="http://purl.org/dc/elements/1.1/"/>
-    <ds:schemaRef ds:uri="http://schemas.openxmlformats.org/package/2006/metadata/core-properties"/>
-    <ds:schemaRef ds:uri="http://schemas.microsoft.com/office/2006/documentManagement/types"/>
-    <ds:schemaRef ds:uri="http://schemas.microsoft.com/office/2006/metadata/properties"/>
-    <ds:schemaRef ds:uri="http://schemas.microsoft.com/office/infopath/2007/PartnerControls"/>
-    <ds:schemaRef ds:uri="http://purl.org/dc/dcmitype/"/>
-    <ds:schemaRef ds:uri="475f1e55-3009-46d8-9566-5d569a2b3a98"/>
-    <ds:schemaRef ds:uri="http://purl.org/dc/terms/"/>
-  </ds:schemaRefs>
-</ds:datastoreItem>
-</file>
-
-<file path=customXml/itemProps3.xml><?xml version="1.0" encoding="utf-8"?>
 <ds:datastoreItem xmlns:ds="http://schemas.openxmlformats.org/officeDocument/2006/customXml" ds:itemID="{CC2FADE7-0FB7-4D32-803A-97A461853B0F}">
   <ds:schemaRefs>
     <ds:schemaRef ds:uri="http://schemas.microsoft.com/office/2006/metadata/contentType"/>
@@ -32748,4 +32962,20 @@
     <ds:schemaRef ds:uri="http://schemas.microsoft.com/internal/obd"/>
   </ds:schemaRefs>
 </ds:datastoreItem>
+</file>
+
+<file path=customXml/itemProps3.xml><?xml version="1.0" encoding="utf-8"?>
+<ds:datastoreItem xmlns:ds="http://schemas.openxmlformats.org/officeDocument/2006/customXml" ds:itemID="{DA5960F2-6186-408B-A0DC-5CA5E58B604F}">
+  <ds:schemaRefs>
+    <ds:schemaRef ds:uri="http://www.w3.org/XML/1998/namespace"/>
+    <ds:schemaRef ds:uri="http://purl.org/dc/elements/1.1/"/>
+    <ds:schemaRef ds:uri="http://schemas.openxmlformats.org/package/2006/metadata/core-properties"/>
+    <ds:schemaRef ds:uri="http://schemas.microsoft.com/office/2006/documentManagement/types"/>
+    <ds:schemaRef ds:uri="http://schemas.microsoft.com/office/2006/metadata/properties"/>
+    <ds:schemaRef ds:uri="http://schemas.microsoft.com/office/infopath/2007/PartnerControls"/>
+    <ds:schemaRef ds:uri="http://purl.org/dc/dcmitype/"/>
+    <ds:schemaRef ds:uri="475f1e55-3009-46d8-9566-5d569a2b3a98"/>
+    <ds:schemaRef ds:uri="http://purl.org/dc/terms/"/>
+  </ds:schemaRefs>
+</ds:datastoreItem>
 </file>
</xml_diff>